<commit_message>
new slides for matthias
</commit_message>
<xml_diff>
--- a/slides/WSTA_L20_machine_translation_word.pptx
+++ b/slides/WSTA_L20_machine_translation_word.pptx
@@ -14145,7 +14145,7 @@
           </a:p>
           <a:p>
             <a:r>
-              <a:rPr lang="en-US" smtClean="0"/>
+              <a:rPr lang="en-US" dirty="0" smtClean="0"/>
               <a:t>Hidden Markov Model</a:t>
             </a:r>
             <a:endParaRPr lang="en-US" dirty="0" smtClean="0"/>
@@ -15537,7 +15537,11 @@
             <a:pPr lvl="1"/>
             <a:r>
               <a:rPr lang="en-AU" dirty="0" smtClean="0"/>
-              <a:t>JM #25, 25.4-25.6 (optional 25.11 for IBM3)</a:t>
+              <a:t>JM2 </a:t>
+            </a:r>
+            <a:r>
+              <a:rPr lang="en-AU" dirty="0" smtClean="0"/>
+              <a:t>#25, 25.4-25.6 (optional 25.11 for IBM3)</a:t>
             </a:r>
             <a:endParaRPr lang="en-AU" dirty="0"/>
           </a:p>
@@ -19269,7 +19273,7 @@
           <a:graphicData uri="http://schemas.openxmlformats.org/presentationml/2006/ole">
             <mc:AlternateContent xmlns:mc="http://schemas.openxmlformats.org/markup-compatibility/2006">
               <mc:Choice xmlns:v="urn:schemas-microsoft-com:vml" Requires="v">
-                <p:oleObj spid="_x0000_s2307" r:id="rId4" imgW="254000" imgH="406400" progId="">
+                <p:oleObj spid="_x0000_s2315" r:id="rId4" imgW="254000" imgH="406400" progId="">
                   <p:embed/>
                 </p:oleObj>
               </mc:Choice>
@@ -19368,7 +19372,7 @@
           <a:graphicData uri="http://schemas.openxmlformats.org/presentationml/2006/ole">
             <mc:AlternateContent xmlns:mc="http://schemas.openxmlformats.org/markup-compatibility/2006">
               <mc:Choice xmlns:v="urn:schemas-microsoft-com:vml" Requires="v">
-                <p:oleObj spid="_x0000_s2308" r:id="rId6" imgW="342900" imgH="406400" progId="">
+                <p:oleObj spid="_x0000_s2316" r:id="rId6" imgW="342900" imgH="406400" progId="">
                   <p:embed/>
                 </p:oleObj>
               </mc:Choice>
@@ -19782,7 +19786,7 @@
           <a:graphicData uri="http://schemas.openxmlformats.org/presentationml/2006/ole">
             <mc:AlternateContent xmlns:mc="http://schemas.openxmlformats.org/markup-compatibility/2006">
               <mc:Choice xmlns:v="urn:schemas-microsoft-com:vml" Requires="v">
-                <p:oleObj spid="_x0000_s2309" r:id="rId8" imgW="76200" imgH="1447800" progId="">
+                <p:oleObj spid="_x0000_s2317" r:id="rId8" imgW="76200" imgH="1447800" progId="">
                   <p:embed/>
                 </p:oleObj>
               </mc:Choice>
@@ -19881,7 +19885,7 @@
           <a:graphicData uri="http://schemas.openxmlformats.org/presentationml/2006/ole">
             <mc:AlternateContent xmlns:mc="http://schemas.openxmlformats.org/markup-compatibility/2006">
               <mc:Choice xmlns:v="urn:schemas-microsoft-com:vml" Requires="v">
-                <p:oleObj spid="_x0000_s2310" r:id="rId10" imgW="723900" imgH="368300" progId="">
+                <p:oleObj spid="_x0000_s2318" r:id="rId10" imgW="723900" imgH="368300" progId="">
                   <p:embed/>
                 </p:oleObj>
               </mc:Choice>
@@ -20835,7 +20839,7 @@
           <a:graphicData uri="http://schemas.openxmlformats.org/presentationml/2006/ole">
             <mc:AlternateContent xmlns:mc="http://schemas.openxmlformats.org/markup-compatibility/2006">
               <mc:Choice xmlns:v="urn:schemas-microsoft-com:vml" Requires="v">
-                <p:oleObj spid="_x0000_s4351" r:id="rId4" imgW="254000" imgH="406400" progId="">
+                <p:oleObj spid="_x0000_s4359" r:id="rId4" imgW="254000" imgH="406400" progId="">
                   <p:embed/>
                 </p:oleObj>
               </mc:Choice>
@@ -20934,7 +20938,7 @@
           <a:graphicData uri="http://schemas.openxmlformats.org/presentationml/2006/ole">
             <mc:AlternateContent xmlns:mc="http://schemas.openxmlformats.org/markup-compatibility/2006">
               <mc:Choice xmlns:v="urn:schemas-microsoft-com:vml" Requires="v">
-                <p:oleObj spid="_x0000_s4352" r:id="rId6" imgW="342900" imgH="406400" progId="">
+                <p:oleObj spid="_x0000_s4360" r:id="rId6" imgW="342900" imgH="406400" progId="">
                   <p:embed/>
                 </p:oleObj>
               </mc:Choice>
@@ -21348,7 +21352,7 @@
           <a:graphicData uri="http://schemas.openxmlformats.org/presentationml/2006/ole">
             <mc:AlternateContent xmlns:mc="http://schemas.openxmlformats.org/markup-compatibility/2006">
               <mc:Choice xmlns:v="urn:schemas-microsoft-com:vml" Requires="v">
-                <p:oleObj spid="_x0000_s4353" r:id="rId8" imgW="76200" imgH="1447800" progId="">
+                <p:oleObj spid="_x0000_s4361" r:id="rId8" imgW="76200" imgH="1447800" progId="">
                   <p:embed/>
                 </p:oleObj>
               </mc:Choice>
@@ -21447,7 +21451,7 @@
           <a:graphicData uri="http://schemas.openxmlformats.org/presentationml/2006/ole">
             <mc:AlternateContent xmlns:mc="http://schemas.openxmlformats.org/markup-compatibility/2006">
               <mc:Choice xmlns:v="urn:schemas-microsoft-com:vml" Requires="v">
-                <p:oleObj spid="_x0000_s4354" r:id="rId10" imgW="723900" imgH="368300" progId="">
+                <p:oleObj spid="_x0000_s4362" r:id="rId10" imgW="723900" imgH="368300" progId="">
                   <p:embed/>
                 </p:oleObj>
               </mc:Choice>

</xml_diff>

<commit_message>
slides on MT for next week
</commit_message>
<xml_diff>
--- a/slides/WSTA_L20_machine_translation_word.pptx
+++ b/slides/WSTA_L20_machine_translation_word.pptx
@@ -239,7 +239,7 @@
           <a:p>
             <a:fld id="{50A97A5B-EA5E-9E4E-B952-F7E0D0C1A3D8}" type="datetimeFigureOut">
               <a:rPr lang="en-US" smtClean="0"/>
-              <a:t>5/8/17</a:t>
+              <a:t>5/12/17</a:t>
             </a:fld>
             <a:endParaRPr lang="en-US"/>
           </a:p>
@@ -852,7 +852,7 @@
           </a:ln>
           <a:extLst>
             <a:ext uri="{AF507438-7753-43e0-B8FC-AC1667EBCBE1}">
-              <a14:hiddenEffects xmlns:a14="http://schemas.microsoft.com/office/drawing/2010/main" xmlns="">
+              <a14:hiddenEffects xmlns="" xmlns:a14="http://schemas.microsoft.com/office/drawing/2010/main">
                 <a:effectLst>
                   <a:outerShdw blurRad="63500" dist="38099" dir="2700000" algn="ctr" rotWithShape="0">
                     <a:srgbClr val="000000">
@@ -883,7 +883,7 @@
           <a:ln/>
           <a:extLst>
             <a:ext uri="{AF507438-7753-43e0-B8FC-AC1667EBCBE1}">
-              <a14:hiddenEffects xmlns:a14="http://schemas.microsoft.com/office/drawing/2010/main" xmlns="">
+              <a14:hiddenEffects xmlns="" xmlns:a14="http://schemas.microsoft.com/office/drawing/2010/main">
                 <a:effectLst>
                   <a:outerShdw blurRad="63500" dist="38099" dir="2700000" algn="ctr" rotWithShape="0">
                     <a:srgbClr val="000000">
@@ -2658,7 +2658,7 @@
           </a:ln>
           <a:extLst>
             <a:ext uri="{AF507438-7753-43e0-B8FC-AC1667EBCBE1}">
-              <a14:hiddenEffects xmlns:a14="http://schemas.microsoft.com/office/drawing/2010/main" xmlns="">
+              <a14:hiddenEffects xmlns="" xmlns:a14="http://schemas.microsoft.com/office/drawing/2010/main">
                 <a:effectLst>
                   <a:outerShdw blurRad="63500" dist="38099" dir="2700000" algn="ctr" rotWithShape="0">
                     <a:srgbClr val="000000">
@@ -2689,7 +2689,7 @@
           <a:ln/>
           <a:extLst>
             <a:ext uri="{AF507438-7753-43e0-B8FC-AC1667EBCBE1}">
-              <a14:hiddenEffects xmlns:a14="http://schemas.microsoft.com/office/drawing/2010/main" xmlns="">
+              <a14:hiddenEffects xmlns="" xmlns:a14="http://schemas.microsoft.com/office/drawing/2010/main">
                 <a:effectLst>
                   <a:outerShdw blurRad="63500" dist="38099" dir="2700000" algn="ctr" rotWithShape="0">
                     <a:srgbClr val="000000">
@@ -2841,7 +2841,7 @@
           </a:ln>
           <a:extLst>
             <a:ext uri="{AF507438-7753-43e0-B8FC-AC1667EBCBE1}">
-              <a14:hiddenEffects xmlns:a14="http://schemas.microsoft.com/office/drawing/2010/main" xmlns="">
+              <a14:hiddenEffects xmlns="" xmlns:a14="http://schemas.microsoft.com/office/drawing/2010/main">
                 <a:effectLst>
                   <a:outerShdw blurRad="63500" dist="38099" dir="2700000" algn="ctr" rotWithShape="0">
                     <a:srgbClr val="000000">
@@ -2872,7 +2872,7 @@
           <a:ln/>
           <a:extLst>
             <a:ext uri="{AF507438-7753-43e0-B8FC-AC1667EBCBE1}">
-              <a14:hiddenEffects xmlns:a14="http://schemas.microsoft.com/office/drawing/2010/main" xmlns="">
+              <a14:hiddenEffects xmlns="" xmlns:a14="http://schemas.microsoft.com/office/drawing/2010/main">
                 <a:effectLst>
                   <a:outerShdw blurRad="63500" dist="38099" dir="2700000" algn="ctr" rotWithShape="0">
                     <a:srgbClr val="000000">
@@ -3781,7 +3781,7 @@
           </a:ln>
           <a:extLst>
             <a:ext uri="{AF507438-7753-43e0-B8FC-AC1667EBCBE1}">
-              <a14:hiddenEffects xmlns:a14="http://schemas.microsoft.com/office/drawing/2010/main" xmlns="">
+              <a14:hiddenEffects xmlns="" xmlns:a14="http://schemas.microsoft.com/office/drawing/2010/main">
                 <a:effectLst>
                   <a:outerShdw blurRad="63500" dist="38099" dir="2700000" algn="ctr" rotWithShape="0">
                     <a:srgbClr val="000000">
@@ -3812,7 +3812,7 @@
           <a:ln/>
           <a:extLst>
             <a:ext uri="{AF507438-7753-43e0-B8FC-AC1667EBCBE1}">
-              <a14:hiddenEffects xmlns:a14="http://schemas.microsoft.com/office/drawing/2010/main" xmlns="">
+              <a14:hiddenEffects xmlns="" xmlns:a14="http://schemas.microsoft.com/office/drawing/2010/main">
                 <a:effectLst>
                   <a:outerShdw blurRad="63500" dist="38099" dir="2700000" algn="ctr" rotWithShape="0">
                     <a:srgbClr val="000000">
@@ -3964,7 +3964,7 @@
           </a:ln>
           <a:extLst>
             <a:ext uri="{AF507438-7753-43e0-B8FC-AC1667EBCBE1}">
-              <a14:hiddenEffects xmlns:a14="http://schemas.microsoft.com/office/drawing/2010/main" xmlns="">
+              <a14:hiddenEffects xmlns="" xmlns:a14="http://schemas.microsoft.com/office/drawing/2010/main">
                 <a:effectLst>
                   <a:outerShdw blurRad="63500" dist="38099" dir="2700000" algn="ctr" rotWithShape="0">
                     <a:srgbClr val="000000">
@@ -3995,7 +3995,7 @@
           <a:ln/>
           <a:extLst>
             <a:ext uri="{AF507438-7753-43e0-B8FC-AC1667EBCBE1}">
-              <a14:hiddenEffects xmlns:a14="http://schemas.microsoft.com/office/drawing/2010/main" xmlns="">
+              <a14:hiddenEffects xmlns="" xmlns:a14="http://schemas.microsoft.com/office/drawing/2010/main">
                 <a:effectLst>
                   <a:outerShdw blurRad="63500" dist="38099" dir="2700000" algn="ctr" rotWithShape="0">
                     <a:srgbClr val="000000">
@@ -4147,7 +4147,7 @@
           </a:ln>
           <a:extLst>
             <a:ext uri="{AF507438-7753-43e0-B8FC-AC1667EBCBE1}">
-              <a14:hiddenEffects xmlns:a14="http://schemas.microsoft.com/office/drawing/2010/main" xmlns="">
+              <a14:hiddenEffects xmlns="" xmlns:a14="http://schemas.microsoft.com/office/drawing/2010/main">
                 <a:effectLst>
                   <a:outerShdw blurRad="63500" dist="38099" dir="2700000" algn="ctr" rotWithShape="0">
                     <a:srgbClr val="000000">
@@ -4178,7 +4178,7 @@
           <a:ln/>
           <a:extLst>
             <a:ext uri="{AF507438-7753-43e0-B8FC-AC1667EBCBE1}">
-              <a14:hiddenEffects xmlns:a14="http://schemas.microsoft.com/office/drawing/2010/main" xmlns="">
+              <a14:hiddenEffects xmlns="" xmlns:a14="http://schemas.microsoft.com/office/drawing/2010/main">
                 <a:effectLst>
                   <a:outerShdw blurRad="63500" dist="38099" dir="2700000" algn="ctr" rotWithShape="0">
                     <a:srgbClr val="000000">
@@ -4353,7 +4353,7 @@
           </a:ln>
           <a:extLst>
             <a:ext uri="{AF507438-7753-43e0-B8FC-AC1667EBCBE1}">
-              <a14:hiddenEffects xmlns:a14="http://schemas.microsoft.com/office/drawing/2010/main" xmlns="">
+              <a14:hiddenEffects xmlns="" xmlns:a14="http://schemas.microsoft.com/office/drawing/2010/main">
                 <a:effectLst>
                   <a:outerShdw blurRad="63500" dist="38099" dir="2700000" algn="ctr" rotWithShape="0">
                     <a:srgbClr val="000000">
@@ -4384,7 +4384,7 @@
           <a:ln/>
           <a:extLst>
             <a:ext uri="{AF507438-7753-43e0-B8FC-AC1667EBCBE1}">
-              <a14:hiddenEffects xmlns:a14="http://schemas.microsoft.com/office/drawing/2010/main" xmlns="">
+              <a14:hiddenEffects xmlns="" xmlns:a14="http://schemas.microsoft.com/office/drawing/2010/main">
                 <a:effectLst>
                   <a:outerShdw blurRad="63500" dist="38099" dir="2700000" algn="ctr" rotWithShape="0">
                     <a:srgbClr val="000000">
@@ -8109,7 +8109,7 @@
           <a:effectLst/>
           <a:extLst>
             <a:ext uri="{909E8E84-426E-40dd-AFC4-6F175D3DCCD1}">
-              <a14:hiddenFill xmlns:a14="http://schemas.microsoft.com/office/drawing/2010/main" xmlns="">
+              <a14:hiddenFill xmlns="" xmlns:a14="http://schemas.microsoft.com/office/drawing/2010/main">
                 <a:blipFill dpi="0" rotWithShape="0">
                   <a:blip xmlns:r="http://schemas.openxmlformats.org/officeDocument/2006/relationships"/>
                   <a:srcRect/>
@@ -8120,7 +8120,7 @@
               </a14:hiddenFill>
             </a:ext>
             <a:ext uri="{91240B29-F687-4f45-9708-019B960494DF}">
-              <a14:hiddenLine xmlns:a14="http://schemas.microsoft.com/office/drawing/2010/main" xmlns="" w="9525" cap="flat">
+              <a14:hiddenLine xmlns="" xmlns:a14="http://schemas.microsoft.com/office/drawing/2010/main" w="9525" cap="flat">
                 <a:solidFill>
                   <a:srgbClr val="000000"/>
                 </a:solidFill>
@@ -8130,7 +8130,7 @@
               </a14:hiddenLine>
             </a:ext>
             <a:ext uri="{AF507438-7753-43e0-B8FC-AC1667EBCBE1}">
-              <a14:hiddenEffects xmlns:a14="http://schemas.microsoft.com/office/drawing/2010/main" xmlns="">
+              <a14:hiddenEffects xmlns="" xmlns:a14="http://schemas.microsoft.com/office/drawing/2010/main">
                 <a:effectLst>
                   <a:outerShdw blurRad="63500" dist="38099" dir="2700000" algn="ctr" rotWithShape="0">
                     <a:srgbClr val="000000">
@@ -9450,7 +9450,7 @@
           <a:effectLst/>
           <a:extLst>
             <a:ext uri="{909E8E84-426E-40dd-AFC4-6F175D3DCCD1}">
-              <a14:hiddenFill xmlns:a14="http://schemas.microsoft.com/office/drawing/2010/main" xmlns="">
+              <a14:hiddenFill xmlns="" xmlns:a14="http://schemas.microsoft.com/office/drawing/2010/main">
                 <a:blipFill dpi="0" rotWithShape="0">
                   <a:blip xmlns:r="http://schemas.openxmlformats.org/officeDocument/2006/relationships"/>
                   <a:srcRect/>
@@ -9461,7 +9461,7 @@
               </a14:hiddenFill>
             </a:ext>
             <a:ext uri="{91240B29-F687-4f45-9708-019B960494DF}">
-              <a14:hiddenLine xmlns:a14="http://schemas.microsoft.com/office/drawing/2010/main" xmlns="" w="9525" cap="flat">
+              <a14:hiddenLine xmlns="" xmlns:a14="http://schemas.microsoft.com/office/drawing/2010/main" w="9525" cap="flat">
                 <a:solidFill>
                   <a:srgbClr val="000000"/>
                 </a:solidFill>
@@ -9471,7 +9471,7 @@
               </a14:hiddenLine>
             </a:ext>
             <a:ext uri="{AF507438-7753-43e0-B8FC-AC1667EBCBE1}">
-              <a14:hiddenEffects xmlns:a14="http://schemas.microsoft.com/office/drawing/2010/main" xmlns="">
+              <a14:hiddenEffects xmlns="" xmlns:a14="http://schemas.microsoft.com/office/drawing/2010/main">
                 <a:effectLst>
                   <a:outerShdw blurRad="63500" dist="38099" dir="2700000" algn="ctr" rotWithShape="0">
                     <a:srgbClr val="000000">
@@ -9775,7 +9775,7 @@
           <a:effectLst/>
           <a:extLst>
             <a:ext uri="{909E8E84-426E-40dd-AFC4-6F175D3DCCD1}">
-              <a14:hiddenFill xmlns:a14="http://schemas.microsoft.com/office/drawing/2010/main" xmlns="">
+              <a14:hiddenFill xmlns="" xmlns:a14="http://schemas.microsoft.com/office/drawing/2010/main">
                 <a:blipFill dpi="0" rotWithShape="0">
                   <a:blip xmlns:r="http://schemas.openxmlformats.org/officeDocument/2006/relationships"/>
                   <a:srcRect/>
@@ -9786,7 +9786,7 @@
               </a14:hiddenFill>
             </a:ext>
             <a:ext uri="{91240B29-F687-4f45-9708-019B960494DF}">
-              <a14:hiddenLine xmlns:a14="http://schemas.microsoft.com/office/drawing/2010/main" xmlns="" w="9525" cap="flat">
+              <a14:hiddenLine xmlns="" xmlns:a14="http://schemas.microsoft.com/office/drawing/2010/main" w="9525" cap="flat">
                 <a:solidFill>
                   <a:srgbClr val="000000"/>
                 </a:solidFill>
@@ -9796,7 +9796,7 @@
               </a14:hiddenLine>
             </a:ext>
             <a:ext uri="{AF507438-7753-43e0-B8FC-AC1667EBCBE1}">
-              <a14:hiddenEffects xmlns:a14="http://schemas.microsoft.com/office/drawing/2010/main" xmlns="">
+              <a14:hiddenEffects xmlns="" xmlns:a14="http://schemas.microsoft.com/office/drawing/2010/main">
                 <a:effectLst>
                   <a:outerShdw blurRad="63500" dist="38099" dir="2700000" algn="ctr" rotWithShape="0">
                     <a:srgbClr val="000000">
@@ -13748,7 +13748,7 @@
           <a:effectLst/>
           <a:extLst>
             <a:ext uri="{909E8E84-426E-40dd-AFC4-6F175D3DCCD1}">
-              <a14:hiddenFill xmlns:a14="http://schemas.microsoft.com/office/drawing/2010/main" xmlns="">
+              <a14:hiddenFill xmlns="" xmlns:a14="http://schemas.microsoft.com/office/drawing/2010/main">
                 <a:blipFill dpi="0" rotWithShape="0">
                   <a:blip xmlns:r="http://schemas.openxmlformats.org/officeDocument/2006/relationships"/>
                   <a:srcRect/>
@@ -13759,7 +13759,7 @@
               </a14:hiddenFill>
             </a:ext>
             <a:ext uri="{91240B29-F687-4f45-9708-019B960494DF}">
-              <a14:hiddenLine xmlns:a14="http://schemas.microsoft.com/office/drawing/2010/main" xmlns="" w="9525" cap="flat">
+              <a14:hiddenLine xmlns="" xmlns:a14="http://schemas.microsoft.com/office/drawing/2010/main" w="9525" cap="flat">
                 <a:solidFill>
                   <a:srgbClr val="000000"/>
                 </a:solidFill>
@@ -13769,7 +13769,7 @@
               </a14:hiddenLine>
             </a:ext>
             <a:ext uri="{AF507438-7753-43e0-B8FC-AC1667EBCBE1}">
-              <a14:hiddenEffects xmlns:a14="http://schemas.microsoft.com/office/drawing/2010/main" xmlns="">
+              <a14:hiddenEffects xmlns="" xmlns:a14="http://schemas.microsoft.com/office/drawing/2010/main">
                 <a:effectLst>
                   <a:outerShdw blurRad="63500" dist="38099" dir="2700000" algn="ctr" rotWithShape="0">
                     <a:srgbClr val="000000">
@@ -14148,7 +14148,6 @@
               <a:rPr lang="en-US" dirty="0" smtClean="0"/>
               <a:t>Hidden Markov Model</a:t>
             </a:r>
-            <a:endParaRPr lang="en-US" dirty="0" smtClean="0"/>
           </a:p>
           <a:p>
             <a:pPr lvl="1"/>
@@ -15537,11 +15536,7 @@
             <a:pPr lvl="1"/>
             <a:r>
               <a:rPr lang="en-AU" dirty="0" smtClean="0"/>
-              <a:t>JM2 </a:t>
-            </a:r>
-            <a:r>
-              <a:rPr lang="en-AU" dirty="0" smtClean="0"/>
-              <a:t>#25, 25.4-25.6 (optional 25.11 for IBM3)</a:t>
+              <a:t>JM2 #25, 25.4-25.6 (optional 25.11 for IBM3)</a:t>
             </a:r>
             <a:endParaRPr lang="en-AU" dirty="0"/>
           </a:p>
@@ -16113,14 +16108,14 @@
           <a:effectLst/>
           <a:extLst>
             <a:ext uri="{909E8E84-426E-40dd-AFC4-6F175D3DCCD1}">
-              <a14:hiddenFill xmlns:a14="http://schemas.microsoft.com/office/drawing/2010/main" xmlns="">
+              <a14:hiddenFill xmlns="" xmlns:a14="http://schemas.microsoft.com/office/drawing/2010/main">
                 <a:solidFill>
                   <a:srgbClr val="FFFFFF"/>
                 </a:solidFill>
               </a14:hiddenFill>
             </a:ext>
             <a:ext uri="{AF507438-7753-43e0-B8FC-AC1667EBCBE1}">
-              <a14:hiddenEffects xmlns:a14="http://schemas.microsoft.com/office/drawing/2010/main" xmlns="">
+              <a14:hiddenEffects xmlns="" xmlns:a14="http://schemas.microsoft.com/office/drawing/2010/main">
                 <a:effectLst>
                   <a:outerShdw blurRad="63500" dist="38099" dir="2700000" algn="ctr" rotWithShape="0">
                     <a:srgbClr val="000000">
@@ -16211,14 +16206,14 @@
           <a:effectLst/>
           <a:extLst>
             <a:ext uri="{909E8E84-426E-40dd-AFC4-6F175D3DCCD1}">
-              <a14:hiddenFill xmlns:a14="http://schemas.microsoft.com/office/drawing/2010/main" xmlns="">
+              <a14:hiddenFill xmlns="" xmlns:a14="http://schemas.microsoft.com/office/drawing/2010/main">
                 <a:solidFill>
                   <a:srgbClr val="FFFFFF"/>
                 </a:solidFill>
               </a14:hiddenFill>
             </a:ext>
             <a:ext uri="{AF507438-7753-43e0-B8FC-AC1667EBCBE1}">
-              <a14:hiddenEffects xmlns:a14="http://schemas.microsoft.com/office/drawing/2010/main" xmlns="">
+              <a14:hiddenEffects xmlns="" xmlns:a14="http://schemas.microsoft.com/office/drawing/2010/main">
                 <a:effectLst>
                   <a:outerShdw blurRad="63500" dist="38099" dir="2700000" algn="ctr" rotWithShape="0">
                     <a:srgbClr val="000000">
@@ -16325,14 +16320,14 @@
           <a:effectLst/>
           <a:extLst>
             <a:ext uri="{909E8E84-426E-40dd-AFC4-6F175D3DCCD1}">
-              <a14:hiddenFill xmlns:a14="http://schemas.microsoft.com/office/drawing/2010/main" xmlns="">
+              <a14:hiddenFill xmlns="" xmlns:a14="http://schemas.microsoft.com/office/drawing/2010/main">
                 <a:solidFill>
                   <a:srgbClr val="FFFFFF"/>
                 </a:solidFill>
               </a14:hiddenFill>
             </a:ext>
             <a:ext uri="{AF507438-7753-43e0-B8FC-AC1667EBCBE1}">
-              <a14:hiddenEffects xmlns:a14="http://schemas.microsoft.com/office/drawing/2010/main" xmlns="">
+              <a14:hiddenEffects xmlns="" xmlns:a14="http://schemas.microsoft.com/office/drawing/2010/main">
                 <a:effectLst>
                   <a:outerShdw blurRad="63500" dist="38099" dir="2700000" algn="ctr" rotWithShape="0">
                     <a:srgbClr val="000000">
@@ -16421,14 +16416,14 @@
           <a:effectLst/>
           <a:extLst>
             <a:ext uri="{909E8E84-426E-40dd-AFC4-6F175D3DCCD1}">
-              <a14:hiddenFill xmlns:a14="http://schemas.microsoft.com/office/drawing/2010/main" xmlns="">
+              <a14:hiddenFill xmlns="" xmlns:a14="http://schemas.microsoft.com/office/drawing/2010/main">
                 <a:solidFill>
                   <a:srgbClr val="FFFFFF"/>
                 </a:solidFill>
               </a14:hiddenFill>
             </a:ext>
             <a:ext uri="{AF507438-7753-43e0-B8FC-AC1667EBCBE1}">
-              <a14:hiddenEffects xmlns:a14="http://schemas.microsoft.com/office/drawing/2010/main" xmlns="">
+              <a14:hiddenEffects xmlns="" xmlns:a14="http://schemas.microsoft.com/office/drawing/2010/main">
                 <a:effectLst>
                   <a:outerShdw blurRad="63500" dist="38099" dir="2700000" algn="ctr" rotWithShape="0">
                     <a:srgbClr val="000000">
@@ -16517,14 +16512,14 @@
           <a:effectLst/>
           <a:extLst>
             <a:ext uri="{909E8E84-426E-40dd-AFC4-6F175D3DCCD1}">
-              <a14:hiddenFill xmlns:a14="http://schemas.microsoft.com/office/drawing/2010/main" xmlns="">
+              <a14:hiddenFill xmlns="" xmlns:a14="http://schemas.microsoft.com/office/drawing/2010/main">
                 <a:solidFill>
                   <a:srgbClr val="FFFFFF"/>
                 </a:solidFill>
               </a14:hiddenFill>
             </a:ext>
             <a:ext uri="{AF507438-7753-43e0-B8FC-AC1667EBCBE1}">
-              <a14:hiddenEffects xmlns:a14="http://schemas.microsoft.com/office/drawing/2010/main" xmlns="">
+              <a14:hiddenEffects xmlns="" xmlns:a14="http://schemas.microsoft.com/office/drawing/2010/main">
                 <a:effectLst>
                   <a:outerShdw blurRad="63500" dist="38099" dir="2700000" algn="ctr" rotWithShape="0">
                     <a:srgbClr val="000000">
@@ -16631,14 +16626,14 @@
           <a:effectLst/>
           <a:extLst>
             <a:ext uri="{909E8E84-426E-40dd-AFC4-6F175D3DCCD1}">
-              <a14:hiddenFill xmlns:a14="http://schemas.microsoft.com/office/drawing/2010/main" xmlns="">
+              <a14:hiddenFill xmlns="" xmlns:a14="http://schemas.microsoft.com/office/drawing/2010/main">
                 <a:solidFill>
                   <a:srgbClr val="FFFFFF"/>
                 </a:solidFill>
               </a14:hiddenFill>
             </a:ext>
             <a:ext uri="{AF507438-7753-43e0-B8FC-AC1667EBCBE1}">
-              <a14:hiddenEffects xmlns:a14="http://schemas.microsoft.com/office/drawing/2010/main" xmlns="">
+              <a14:hiddenEffects xmlns="" xmlns:a14="http://schemas.microsoft.com/office/drawing/2010/main">
                 <a:effectLst>
                   <a:outerShdw blurRad="63500" dist="38099" dir="2700000" algn="ctr" rotWithShape="0">
                     <a:srgbClr val="000000">
@@ -16727,14 +16722,14 @@
           <a:effectLst/>
           <a:extLst>
             <a:ext uri="{909E8E84-426E-40dd-AFC4-6F175D3DCCD1}">
-              <a14:hiddenFill xmlns:a14="http://schemas.microsoft.com/office/drawing/2010/main" xmlns="">
+              <a14:hiddenFill xmlns="" xmlns:a14="http://schemas.microsoft.com/office/drawing/2010/main">
                 <a:solidFill>
                   <a:srgbClr val="FFFFFF"/>
                 </a:solidFill>
               </a14:hiddenFill>
             </a:ext>
             <a:ext uri="{AF507438-7753-43e0-B8FC-AC1667EBCBE1}">
-              <a14:hiddenEffects xmlns:a14="http://schemas.microsoft.com/office/drawing/2010/main" xmlns="">
+              <a14:hiddenEffects xmlns="" xmlns:a14="http://schemas.microsoft.com/office/drawing/2010/main">
                 <a:effectLst>
                   <a:outerShdw blurRad="63500" dist="38099" dir="2700000" algn="ctr" rotWithShape="0">
                     <a:srgbClr val="000000">
@@ -16821,12 +16816,12 @@
           <a:effectLst/>
           <a:extLst>
             <a:ext uri="{909E8E84-426E-40dd-AFC4-6F175D3DCCD1}">
-              <a14:hiddenFill xmlns:a14="http://schemas.microsoft.com/office/drawing/2010/main" xmlns="">
+              <a14:hiddenFill xmlns="" xmlns:a14="http://schemas.microsoft.com/office/drawing/2010/main">
                 <a:noFill/>
               </a14:hiddenFill>
             </a:ext>
             <a:ext uri="{AF507438-7753-43e0-B8FC-AC1667EBCBE1}">
-              <a14:hiddenEffects xmlns:a14="http://schemas.microsoft.com/office/drawing/2010/main" xmlns="">
+              <a14:hiddenEffects xmlns="" xmlns:a14="http://schemas.microsoft.com/office/drawing/2010/main">
                 <a:effectLst>
                   <a:outerShdw blurRad="63500" dist="38099" dir="2700000" algn="ctr" rotWithShape="0">
                     <a:srgbClr val="000000">
@@ -16881,12 +16876,12 @@
           <a:effectLst/>
           <a:extLst>
             <a:ext uri="{909E8E84-426E-40dd-AFC4-6F175D3DCCD1}">
-              <a14:hiddenFill xmlns:a14="http://schemas.microsoft.com/office/drawing/2010/main" xmlns="">
+              <a14:hiddenFill xmlns="" xmlns:a14="http://schemas.microsoft.com/office/drawing/2010/main">
                 <a:noFill/>
               </a14:hiddenFill>
             </a:ext>
             <a:ext uri="{AF507438-7753-43e0-B8FC-AC1667EBCBE1}">
-              <a14:hiddenEffects xmlns:a14="http://schemas.microsoft.com/office/drawing/2010/main" xmlns="">
+              <a14:hiddenEffects xmlns="" xmlns:a14="http://schemas.microsoft.com/office/drawing/2010/main">
                 <a:effectLst>
                   <a:outerShdw blurRad="63500" dist="38099" dir="2700000" algn="ctr" rotWithShape="0">
                     <a:srgbClr val="000000">
@@ -16941,12 +16936,12 @@
           <a:effectLst/>
           <a:extLst>
             <a:ext uri="{909E8E84-426E-40dd-AFC4-6F175D3DCCD1}">
-              <a14:hiddenFill xmlns:a14="http://schemas.microsoft.com/office/drawing/2010/main" xmlns="">
+              <a14:hiddenFill xmlns="" xmlns:a14="http://schemas.microsoft.com/office/drawing/2010/main">
                 <a:noFill/>
               </a14:hiddenFill>
             </a:ext>
             <a:ext uri="{AF507438-7753-43e0-B8FC-AC1667EBCBE1}">
-              <a14:hiddenEffects xmlns:a14="http://schemas.microsoft.com/office/drawing/2010/main" xmlns="">
+              <a14:hiddenEffects xmlns="" xmlns:a14="http://schemas.microsoft.com/office/drawing/2010/main">
                 <a:effectLst>
                   <a:outerShdw blurRad="63500" dist="38099" dir="2700000" algn="ctr" rotWithShape="0">
                     <a:srgbClr val="000000">
@@ -17001,12 +16996,12 @@
           <a:effectLst/>
           <a:extLst>
             <a:ext uri="{909E8E84-426E-40dd-AFC4-6F175D3DCCD1}">
-              <a14:hiddenFill xmlns:a14="http://schemas.microsoft.com/office/drawing/2010/main" xmlns="">
+              <a14:hiddenFill xmlns="" xmlns:a14="http://schemas.microsoft.com/office/drawing/2010/main">
                 <a:noFill/>
               </a14:hiddenFill>
             </a:ext>
             <a:ext uri="{AF507438-7753-43e0-B8FC-AC1667EBCBE1}">
-              <a14:hiddenEffects xmlns:a14="http://schemas.microsoft.com/office/drawing/2010/main" xmlns="">
+              <a14:hiddenEffects xmlns="" xmlns:a14="http://schemas.microsoft.com/office/drawing/2010/main">
                 <a:effectLst>
                   <a:outerShdw blurRad="63500" dist="38099" dir="2700000" algn="ctr" rotWithShape="0">
                     <a:srgbClr val="000000">
@@ -17061,12 +17056,12 @@
           <a:effectLst/>
           <a:extLst>
             <a:ext uri="{909E8E84-426E-40dd-AFC4-6F175D3DCCD1}">
-              <a14:hiddenFill xmlns:a14="http://schemas.microsoft.com/office/drawing/2010/main" xmlns="">
+              <a14:hiddenFill xmlns="" xmlns:a14="http://schemas.microsoft.com/office/drawing/2010/main">
                 <a:noFill/>
               </a14:hiddenFill>
             </a:ext>
             <a:ext uri="{AF507438-7753-43e0-B8FC-AC1667EBCBE1}">
-              <a14:hiddenEffects xmlns:a14="http://schemas.microsoft.com/office/drawing/2010/main" xmlns="">
+              <a14:hiddenEffects xmlns="" xmlns:a14="http://schemas.microsoft.com/office/drawing/2010/main">
                 <a:effectLst>
                   <a:outerShdw blurRad="63500" dist="38099" dir="2700000" algn="ctr" rotWithShape="0">
                     <a:srgbClr val="000000">
@@ -17121,12 +17116,12 @@
           <a:effectLst/>
           <a:extLst>
             <a:ext uri="{909E8E84-426E-40dd-AFC4-6F175D3DCCD1}">
-              <a14:hiddenFill xmlns:a14="http://schemas.microsoft.com/office/drawing/2010/main" xmlns="">
+              <a14:hiddenFill xmlns="" xmlns:a14="http://schemas.microsoft.com/office/drawing/2010/main">
                 <a:noFill/>
               </a14:hiddenFill>
             </a:ext>
             <a:ext uri="{AF507438-7753-43e0-B8FC-AC1667EBCBE1}">
-              <a14:hiddenEffects xmlns:a14="http://schemas.microsoft.com/office/drawing/2010/main" xmlns="">
+              <a14:hiddenEffects xmlns="" xmlns:a14="http://schemas.microsoft.com/office/drawing/2010/main">
                 <a:effectLst>
                   <a:outerShdw blurRad="63500" dist="38099" dir="2700000" algn="ctr" rotWithShape="0">
                     <a:srgbClr val="000000">
@@ -17181,12 +17176,12 @@
           <a:effectLst/>
           <a:extLst>
             <a:ext uri="{909E8E84-426E-40dd-AFC4-6F175D3DCCD1}">
-              <a14:hiddenFill xmlns:a14="http://schemas.microsoft.com/office/drawing/2010/main" xmlns="">
+              <a14:hiddenFill xmlns="" xmlns:a14="http://schemas.microsoft.com/office/drawing/2010/main">
                 <a:noFill/>
               </a14:hiddenFill>
             </a:ext>
             <a:ext uri="{AF507438-7753-43e0-B8FC-AC1667EBCBE1}">
-              <a14:hiddenEffects xmlns:a14="http://schemas.microsoft.com/office/drawing/2010/main" xmlns="">
+              <a14:hiddenEffects xmlns="" xmlns:a14="http://schemas.microsoft.com/office/drawing/2010/main">
                 <a:effectLst>
                   <a:outerShdw blurRad="63500" dist="38099" dir="2700000" algn="ctr" rotWithShape="0">
                     <a:srgbClr val="000000">
@@ -17241,12 +17236,12 @@
           <a:effectLst/>
           <a:extLst>
             <a:ext uri="{909E8E84-426E-40dd-AFC4-6F175D3DCCD1}">
-              <a14:hiddenFill xmlns:a14="http://schemas.microsoft.com/office/drawing/2010/main" xmlns="">
+              <a14:hiddenFill xmlns="" xmlns:a14="http://schemas.microsoft.com/office/drawing/2010/main">
                 <a:noFill/>
               </a14:hiddenFill>
             </a:ext>
             <a:ext uri="{AF507438-7753-43e0-B8FC-AC1667EBCBE1}">
-              <a14:hiddenEffects xmlns:a14="http://schemas.microsoft.com/office/drawing/2010/main" xmlns="">
+              <a14:hiddenEffects xmlns="" xmlns:a14="http://schemas.microsoft.com/office/drawing/2010/main">
                 <a:effectLst>
                   <a:outerShdw blurRad="63500" dist="38099" dir="2700000" algn="ctr" rotWithShape="0">
                     <a:srgbClr val="000000">
@@ -17301,12 +17296,12 @@
           <a:effectLst/>
           <a:extLst>
             <a:ext uri="{909E8E84-426E-40dd-AFC4-6F175D3DCCD1}">
-              <a14:hiddenFill xmlns:a14="http://schemas.microsoft.com/office/drawing/2010/main" xmlns="">
+              <a14:hiddenFill xmlns="" xmlns:a14="http://schemas.microsoft.com/office/drawing/2010/main">
                 <a:noFill/>
               </a14:hiddenFill>
             </a:ext>
             <a:ext uri="{AF507438-7753-43e0-B8FC-AC1667EBCBE1}">
-              <a14:hiddenEffects xmlns:a14="http://schemas.microsoft.com/office/drawing/2010/main" xmlns="">
+              <a14:hiddenEffects xmlns="" xmlns:a14="http://schemas.microsoft.com/office/drawing/2010/main">
                 <a:effectLst>
                   <a:outerShdw blurRad="63500" dist="38099" dir="2700000" algn="ctr" rotWithShape="0">
                     <a:srgbClr val="000000">
@@ -17356,14 +17351,14 @@
           <a:effectLst/>
           <a:extLst>
             <a:ext uri="{909E8E84-426E-40dd-AFC4-6F175D3DCCD1}">
-              <a14:hiddenFill xmlns:a14="http://schemas.microsoft.com/office/drawing/2010/main" xmlns="">
+              <a14:hiddenFill xmlns="" xmlns:a14="http://schemas.microsoft.com/office/drawing/2010/main">
                 <a:solidFill>
                   <a:srgbClr val="FFFFFF"/>
                 </a:solidFill>
               </a14:hiddenFill>
             </a:ext>
             <a:ext uri="{91240B29-F687-4f45-9708-019B960494DF}">
-              <a14:hiddenLine xmlns:a14="http://schemas.microsoft.com/office/drawing/2010/main" xmlns="" w="9525" cap="flat">
+              <a14:hiddenLine xmlns="" xmlns:a14="http://schemas.microsoft.com/office/drawing/2010/main" w="9525" cap="flat">
                 <a:solidFill>
                   <a:srgbClr val="000000"/>
                 </a:solidFill>
@@ -17373,7 +17368,7 @@
               </a14:hiddenLine>
             </a:ext>
             <a:ext uri="{AF507438-7753-43e0-B8FC-AC1667EBCBE1}">
-              <a14:hiddenEffects xmlns:a14="http://schemas.microsoft.com/office/drawing/2010/main" xmlns="">
+              <a14:hiddenEffects xmlns="" xmlns:a14="http://schemas.microsoft.com/office/drawing/2010/main">
                 <a:effectLst>
                   <a:outerShdw blurRad="63500" dist="38099" dir="2700000" algn="ctr" rotWithShape="0">
                     <a:srgbClr val="000000">
@@ -17612,14 +17607,14 @@
           <a:effectLst/>
           <a:extLst>
             <a:ext uri="{909E8E84-426E-40dd-AFC4-6F175D3DCCD1}">
-              <a14:hiddenFill xmlns:a14="http://schemas.microsoft.com/office/drawing/2010/main" xmlns="">
+              <a14:hiddenFill xmlns="" xmlns:a14="http://schemas.microsoft.com/office/drawing/2010/main">
                 <a:solidFill>
                   <a:srgbClr val="FFFFFF"/>
                 </a:solidFill>
               </a14:hiddenFill>
             </a:ext>
             <a:ext uri="{91240B29-F687-4f45-9708-019B960494DF}">
-              <a14:hiddenLine xmlns:a14="http://schemas.microsoft.com/office/drawing/2010/main" xmlns="" w="9525" cap="flat">
+              <a14:hiddenLine xmlns="" xmlns:a14="http://schemas.microsoft.com/office/drawing/2010/main" w="9525" cap="flat">
                 <a:solidFill>
                   <a:srgbClr val="000000"/>
                 </a:solidFill>
@@ -17629,7 +17624,7 @@
               </a14:hiddenLine>
             </a:ext>
             <a:ext uri="{AF507438-7753-43e0-B8FC-AC1667EBCBE1}">
-              <a14:hiddenEffects xmlns:a14="http://schemas.microsoft.com/office/drawing/2010/main" xmlns="">
+              <a14:hiddenEffects xmlns="" xmlns:a14="http://schemas.microsoft.com/office/drawing/2010/main">
                 <a:effectLst>
                   <a:outerShdw blurRad="63500" dist="38099" dir="2700000" algn="ctr" rotWithShape="0">
                     <a:srgbClr val="000000">
@@ -17868,14 +17863,14 @@
           <a:effectLst/>
           <a:extLst>
             <a:ext uri="{909E8E84-426E-40dd-AFC4-6F175D3DCCD1}">
-              <a14:hiddenFill xmlns:a14="http://schemas.microsoft.com/office/drawing/2010/main" xmlns="">
+              <a14:hiddenFill xmlns="" xmlns:a14="http://schemas.microsoft.com/office/drawing/2010/main">
                 <a:solidFill>
                   <a:srgbClr val="FFFFFF"/>
                 </a:solidFill>
               </a14:hiddenFill>
             </a:ext>
             <a:ext uri="{91240B29-F687-4f45-9708-019B960494DF}">
-              <a14:hiddenLine xmlns:a14="http://schemas.microsoft.com/office/drawing/2010/main" xmlns="" w="9525" cap="flat">
+              <a14:hiddenLine xmlns="" xmlns:a14="http://schemas.microsoft.com/office/drawing/2010/main" w="9525" cap="flat">
                 <a:solidFill>
                   <a:srgbClr val="000000"/>
                 </a:solidFill>
@@ -17885,7 +17880,7 @@
               </a14:hiddenLine>
             </a:ext>
             <a:ext uri="{AF507438-7753-43e0-B8FC-AC1667EBCBE1}">
-              <a14:hiddenEffects xmlns:a14="http://schemas.microsoft.com/office/drawing/2010/main" xmlns="">
+              <a14:hiddenEffects xmlns="" xmlns:a14="http://schemas.microsoft.com/office/drawing/2010/main">
                 <a:effectLst>
                   <a:outerShdw blurRad="63500" dist="38099" dir="2700000" algn="ctr" rotWithShape="0">
                     <a:srgbClr val="000000">
@@ -18124,14 +18119,14 @@
           <a:effectLst/>
           <a:extLst>
             <a:ext uri="{909E8E84-426E-40dd-AFC4-6F175D3DCCD1}">
-              <a14:hiddenFill xmlns:a14="http://schemas.microsoft.com/office/drawing/2010/main" xmlns="">
+              <a14:hiddenFill xmlns="" xmlns:a14="http://schemas.microsoft.com/office/drawing/2010/main">
                 <a:solidFill>
                   <a:srgbClr val="FFFFFF"/>
                 </a:solidFill>
               </a14:hiddenFill>
             </a:ext>
             <a:ext uri="{91240B29-F687-4f45-9708-019B960494DF}">
-              <a14:hiddenLine xmlns:a14="http://schemas.microsoft.com/office/drawing/2010/main" xmlns="" w="9525" cap="flat">
+              <a14:hiddenLine xmlns="" xmlns:a14="http://schemas.microsoft.com/office/drawing/2010/main" w="9525" cap="flat">
                 <a:solidFill>
                   <a:srgbClr val="000000"/>
                 </a:solidFill>
@@ -18141,7 +18136,7 @@
               </a14:hiddenLine>
             </a:ext>
             <a:ext uri="{AF507438-7753-43e0-B8FC-AC1667EBCBE1}">
-              <a14:hiddenEffects xmlns:a14="http://schemas.microsoft.com/office/drawing/2010/main" xmlns="">
+              <a14:hiddenEffects xmlns="" xmlns:a14="http://schemas.microsoft.com/office/drawing/2010/main">
                 <a:effectLst>
                   <a:outerShdw blurRad="63500" dist="38099" dir="2700000" algn="ctr" rotWithShape="0">
                     <a:srgbClr val="000000">
@@ -18662,12 +18657,12 @@
           <a:effectLst/>
           <a:extLst>
             <a:ext uri="{909E8E84-426E-40dd-AFC4-6F175D3DCCD1}">
-              <a14:hiddenFill xmlns:a14="http://schemas.microsoft.com/office/drawing/2010/main" xmlns="">
+              <a14:hiddenFill xmlns="" xmlns:a14="http://schemas.microsoft.com/office/drawing/2010/main">
                 <a:noFill/>
               </a14:hiddenFill>
             </a:ext>
             <a:ext uri="{AF507438-7753-43e0-B8FC-AC1667EBCBE1}">
-              <a14:hiddenEffects xmlns:a14="http://schemas.microsoft.com/office/drawing/2010/main" xmlns="">
+              <a14:hiddenEffects xmlns="" xmlns:a14="http://schemas.microsoft.com/office/drawing/2010/main">
                 <a:effectLst>
                   <a:outerShdw blurRad="63500" dist="38099" dir="2700000" algn="ctr" rotWithShape="0">
                     <a:srgbClr val="000000">
@@ -18720,12 +18715,12 @@
           <a:effectLst/>
           <a:extLst>
             <a:ext uri="{909E8E84-426E-40dd-AFC4-6F175D3DCCD1}">
-              <a14:hiddenFill xmlns:a14="http://schemas.microsoft.com/office/drawing/2010/main" xmlns="">
+              <a14:hiddenFill xmlns="" xmlns:a14="http://schemas.microsoft.com/office/drawing/2010/main">
                 <a:noFill/>
               </a14:hiddenFill>
             </a:ext>
             <a:ext uri="{AF507438-7753-43e0-B8FC-AC1667EBCBE1}">
-              <a14:hiddenEffects xmlns:a14="http://schemas.microsoft.com/office/drawing/2010/main" xmlns="">
+              <a14:hiddenEffects xmlns="" xmlns:a14="http://schemas.microsoft.com/office/drawing/2010/main">
                 <a:effectLst>
                   <a:outerShdw blurRad="63500" dist="38099" dir="2700000" algn="ctr" rotWithShape="0">
                     <a:srgbClr val="000000">
@@ -18780,7 +18775,7 @@
           <a:effectLst/>
           <a:extLst>
             <a:ext uri="{AF507438-7753-43e0-B8FC-AC1667EBCBE1}">
-              <a14:hiddenEffects xmlns:a14="http://schemas.microsoft.com/office/drawing/2010/main" xmlns="">
+              <a14:hiddenEffects xmlns="" xmlns:a14="http://schemas.microsoft.com/office/drawing/2010/main">
                 <a:effectLst>
                   <a:outerShdw blurRad="63500" dist="38099" dir="2700000" algn="ctr" rotWithShape="0">
                     <a:srgbClr val="000000">
@@ -19027,7 +19022,7 @@
           <a:effectLst/>
           <a:extLst>
             <a:ext uri="{AF507438-7753-43e0-B8FC-AC1667EBCBE1}">
-              <a14:hiddenEffects xmlns:a14="http://schemas.microsoft.com/office/drawing/2010/main" xmlns="">
+              <a14:hiddenEffects xmlns="" xmlns:a14="http://schemas.microsoft.com/office/drawing/2010/main">
                 <a:effectLst>
                   <a:outerShdw blurRad="63500" dist="38099" dir="2700000" algn="ctr" rotWithShape="0">
                     <a:srgbClr val="000000">
@@ -19273,7 +19268,7 @@
           <a:graphicData uri="http://schemas.openxmlformats.org/presentationml/2006/ole">
             <mc:AlternateContent xmlns:mc="http://schemas.openxmlformats.org/markup-compatibility/2006">
               <mc:Choice xmlns:v="urn:schemas-microsoft-com:vml" Requires="v">
-                <p:oleObj spid="_x0000_s2315" r:id="rId4" imgW="254000" imgH="406400" progId="">
+                <p:oleObj spid="_x0000_s2320" r:id="rId4" imgW="254000" imgH="406400" progId="">
                   <p:embed/>
                 </p:oleObj>
               </mc:Choice>
@@ -19372,7 +19367,7 @@
           <a:graphicData uri="http://schemas.openxmlformats.org/presentationml/2006/ole">
             <mc:AlternateContent xmlns:mc="http://schemas.openxmlformats.org/markup-compatibility/2006">
               <mc:Choice xmlns:v="urn:schemas-microsoft-com:vml" Requires="v">
-                <p:oleObj spid="_x0000_s2316" r:id="rId6" imgW="342900" imgH="406400" progId="">
+                <p:oleObj spid="_x0000_s2321" r:id="rId6" imgW="342900" imgH="406400" progId="">
                   <p:embed/>
                 </p:oleObj>
               </mc:Choice>
@@ -19483,12 +19478,12 @@
           <a:effectLst/>
           <a:extLst>
             <a:ext uri="{909E8E84-426E-40dd-AFC4-6F175D3DCCD1}">
-              <a14:hiddenFill xmlns:a14="http://schemas.microsoft.com/office/drawing/2010/main" xmlns="">
+              <a14:hiddenFill xmlns="" xmlns:a14="http://schemas.microsoft.com/office/drawing/2010/main">
                 <a:noFill/>
               </a14:hiddenFill>
             </a:ext>
             <a:ext uri="{AF507438-7753-43e0-B8FC-AC1667EBCBE1}">
-              <a14:hiddenEffects xmlns:a14="http://schemas.microsoft.com/office/drawing/2010/main" xmlns="">
+              <a14:hiddenEffects xmlns="" xmlns:a14="http://schemas.microsoft.com/office/drawing/2010/main">
                 <a:effectLst>
                   <a:outerShdw blurRad="63500" dist="38099" dir="2700000" algn="ctr" rotWithShape="0">
                     <a:srgbClr val="000000">
@@ -19543,7 +19538,7 @@
           <a:effectLst/>
           <a:extLst>
             <a:ext uri="{AF507438-7753-43e0-B8FC-AC1667EBCBE1}">
-              <a14:hiddenEffects xmlns:a14="http://schemas.microsoft.com/office/drawing/2010/main" xmlns="">
+              <a14:hiddenEffects xmlns="" xmlns:a14="http://schemas.microsoft.com/office/drawing/2010/main">
                 <a:effectLst>
                   <a:outerShdw blurRad="63500" dist="38099" dir="2700000" algn="ctr" rotWithShape="0">
                     <a:srgbClr val="000000">
@@ -19786,7 +19781,7 @@
           <a:graphicData uri="http://schemas.openxmlformats.org/presentationml/2006/ole">
             <mc:AlternateContent xmlns:mc="http://schemas.openxmlformats.org/markup-compatibility/2006">
               <mc:Choice xmlns:v="urn:schemas-microsoft-com:vml" Requires="v">
-                <p:oleObj spid="_x0000_s2317" r:id="rId8" imgW="76200" imgH="1447800" progId="">
+                <p:oleObj spid="_x0000_s2322" r:id="rId8" imgW="76200" imgH="1447800" progId="">
                   <p:embed/>
                 </p:oleObj>
               </mc:Choice>
@@ -19885,7 +19880,7 @@
           <a:graphicData uri="http://schemas.openxmlformats.org/presentationml/2006/ole">
             <mc:AlternateContent xmlns:mc="http://schemas.openxmlformats.org/markup-compatibility/2006">
               <mc:Choice xmlns:v="urn:schemas-microsoft-com:vml" Requires="v">
-                <p:oleObj spid="_x0000_s2318" r:id="rId10" imgW="723900" imgH="368300" progId="">
+                <p:oleObj spid="_x0000_s2323" r:id="rId10" imgW="723900" imgH="368300" progId="">
                   <p:embed/>
                 </p:oleObj>
               </mc:Choice>
@@ -20228,12 +20223,12 @@
           <a:effectLst/>
           <a:extLst>
             <a:ext uri="{909E8E84-426E-40dd-AFC4-6F175D3DCCD1}">
-              <a14:hiddenFill xmlns:a14="http://schemas.microsoft.com/office/drawing/2010/main" xmlns="">
+              <a14:hiddenFill xmlns="" xmlns:a14="http://schemas.microsoft.com/office/drawing/2010/main">
                 <a:noFill/>
               </a14:hiddenFill>
             </a:ext>
             <a:ext uri="{AF507438-7753-43e0-B8FC-AC1667EBCBE1}">
-              <a14:hiddenEffects xmlns:a14="http://schemas.microsoft.com/office/drawing/2010/main" xmlns="">
+              <a14:hiddenEffects xmlns="" xmlns:a14="http://schemas.microsoft.com/office/drawing/2010/main">
                 <a:effectLst>
                   <a:outerShdw blurRad="63500" dist="38099" dir="2700000" algn="ctr" rotWithShape="0">
                     <a:srgbClr val="000000">
@@ -20286,12 +20281,12 @@
           <a:effectLst/>
           <a:extLst>
             <a:ext uri="{909E8E84-426E-40dd-AFC4-6F175D3DCCD1}">
-              <a14:hiddenFill xmlns:a14="http://schemas.microsoft.com/office/drawing/2010/main" xmlns="">
+              <a14:hiddenFill xmlns="" xmlns:a14="http://schemas.microsoft.com/office/drawing/2010/main">
                 <a:noFill/>
               </a14:hiddenFill>
             </a:ext>
             <a:ext uri="{AF507438-7753-43e0-B8FC-AC1667EBCBE1}">
-              <a14:hiddenEffects xmlns:a14="http://schemas.microsoft.com/office/drawing/2010/main" xmlns="">
+              <a14:hiddenEffects xmlns="" xmlns:a14="http://schemas.microsoft.com/office/drawing/2010/main">
                 <a:effectLst>
                   <a:outerShdw blurRad="63500" dist="38099" dir="2700000" algn="ctr" rotWithShape="0">
                     <a:srgbClr val="000000">
@@ -20346,7 +20341,7 @@
           <a:effectLst/>
           <a:extLst>
             <a:ext uri="{AF507438-7753-43e0-B8FC-AC1667EBCBE1}">
-              <a14:hiddenEffects xmlns:a14="http://schemas.microsoft.com/office/drawing/2010/main" xmlns="">
+              <a14:hiddenEffects xmlns="" xmlns:a14="http://schemas.microsoft.com/office/drawing/2010/main">
                 <a:effectLst>
                   <a:outerShdw blurRad="63500" dist="38099" dir="2700000" algn="ctr" rotWithShape="0">
                     <a:srgbClr val="000000">
@@ -20593,7 +20588,7 @@
           <a:effectLst/>
           <a:extLst>
             <a:ext uri="{AF507438-7753-43e0-B8FC-AC1667EBCBE1}">
-              <a14:hiddenEffects xmlns:a14="http://schemas.microsoft.com/office/drawing/2010/main" xmlns="">
+              <a14:hiddenEffects xmlns="" xmlns:a14="http://schemas.microsoft.com/office/drawing/2010/main">
                 <a:effectLst>
                   <a:outerShdw blurRad="63500" dist="38099" dir="2700000" algn="ctr" rotWithShape="0">
                     <a:srgbClr val="000000">
@@ -20839,7 +20834,7 @@
           <a:graphicData uri="http://schemas.openxmlformats.org/presentationml/2006/ole">
             <mc:AlternateContent xmlns:mc="http://schemas.openxmlformats.org/markup-compatibility/2006">
               <mc:Choice xmlns:v="urn:schemas-microsoft-com:vml" Requires="v">
-                <p:oleObj spid="_x0000_s4359" r:id="rId4" imgW="254000" imgH="406400" progId="">
+                <p:oleObj spid="_x0000_s4364" r:id="rId4" imgW="254000" imgH="406400" progId="">
                   <p:embed/>
                 </p:oleObj>
               </mc:Choice>
@@ -20938,7 +20933,7 @@
           <a:graphicData uri="http://schemas.openxmlformats.org/presentationml/2006/ole">
             <mc:AlternateContent xmlns:mc="http://schemas.openxmlformats.org/markup-compatibility/2006">
               <mc:Choice xmlns:v="urn:schemas-microsoft-com:vml" Requires="v">
-                <p:oleObj spid="_x0000_s4360" r:id="rId6" imgW="342900" imgH="406400" progId="">
+                <p:oleObj spid="_x0000_s4365" r:id="rId6" imgW="342900" imgH="406400" progId="">
                   <p:embed/>
                 </p:oleObj>
               </mc:Choice>
@@ -21049,12 +21044,12 @@
           <a:effectLst/>
           <a:extLst>
             <a:ext uri="{909E8E84-426E-40dd-AFC4-6F175D3DCCD1}">
-              <a14:hiddenFill xmlns:a14="http://schemas.microsoft.com/office/drawing/2010/main" xmlns="">
+              <a14:hiddenFill xmlns="" xmlns:a14="http://schemas.microsoft.com/office/drawing/2010/main">
                 <a:noFill/>
               </a14:hiddenFill>
             </a:ext>
             <a:ext uri="{AF507438-7753-43e0-B8FC-AC1667EBCBE1}">
-              <a14:hiddenEffects xmlns:a14="http://schemas.microsoft.com/office/drawing/2010/main" xmlns="">
+              <a14:hiddenEffects xmlns="" xmlns:a14="http://schemas.microsoft.com/office/drawing/2010/main">
                 <a:effectLst>
                   <a:outerShdw blurRad="63500" dist="38099" dir="2700000" algn="ctr" rotWithShape="0">
                     <a:srgbClr val="000000">
@@ -21109,7 +21104,7 @@
           <a:effectLst/>
           <a:extLst>
             <a:ext uri="{AF507438-7753-43e0-B8FC-AC1667EBCBE1}">
-              <a14:hiddenEffects xmlns:a14="http://schemas.microsoft.com/office/drawing/2010/main" xmlns="">
+              <a14:hiddenEffects xmlns="" xmlns:a14="http://schemas.microsoft.com/office/drawing/2010/main">
                 <a:effectLst>
                   <a:outerShdw blurRad="63500" dist="38099" dir="2700000" algn="ctr" rotWithShape="0">
                     <a:srgbClr val="000000">
@@ -21352,7 +21347,7 @@
           <a:graphicData uri="http://schemas.openxmlformats.org/presentationml/2006/ole">
             <mc:AlternateContent xmlns:mc="http://schemas.openxmlformats.org/markup-compatibility/2006">
               <mc:Choice xmlns:v="urn:schemas-microsoft-com:vml" Requires="v">
-                <p:oleObj spid="_x0000_s4361" r:id="rId8" imgW="76200" imgH="1447800" progId="">
+                <p:oleObj spid="_x0000_s4366" r:id="rId8" imgW="76200" imgH="1447800" progId="">
                   <p:embed/>
                 </p:oleObj>
               </mc:Choice>
@@ -21451,7 +21446,7 @@
           <a:graphicData uri="http://schemas.openxmlformats.org/presentationml/2006/ole">
             <mc:AlternateContent xmlns:mc="http://schemas.openxmlformats.org/markup-compatibility/2006">
               <mc:Choice xmlns:v="urn:schemas-microsoft-com:vml" Requires="v">
-                <p:oleObj spid="_x0000_s4362" r:id="rId10" imgW="723900" imgH="368300" progId="">
+                <p:oleObj spid="_x0000_s4367" r:id="rId10" imgW="723900" imgH="368300" progId="">
                   <p:embed/>
                 </p:oleObj>
               </mc:Choice>

</xml_diff>